<commit_message>
Updated readme and backlog
</commit_message>
<xml_diff>
--- a/readme_documents/wireframes/wireframe_gif.pptx
+++ b/readme_documents/wireframes/wireframe_gif.pptx
@@ -256,7 +256,7 @@
           <a:p>
             <a:fld id="{410044D7-9578-4EFF-9B44-B51A5B51F4F7}" type="datetimeFigureOut">
               <a:rPr lang="pt-BR" smtClean="0"/>
-              <a:t>29/03/2023</a:t>
+              <a:t>30/03/2023</a:t>
             </a:fld>
             <a:endParaRPr lang="pt-BR"/>
           </a:p>
@@ -314,7 +314,7 @@
   <p:clrMapOvr>
     <a:masterClrMapping/>
   </p:clrMapOvr>
-  <p:transition spd="slow" advClick="0" advTm="5000"/>
+  <p:transition spd="slow" advClick="0" advTm="30000"/>
 </p:sldLayout>
 </file>
 
@@ -427,7 +427,7 @@
           <a:p>
             <a:fld id="{410044D7-9578-4EFF-9B44-B51A5B51F4F7}" type="datetimeFigureOut">
               <a:rPr lang="pt-BR" smtClean="0"/>
-              <a:t>29/03/2023</a:t>
+              <a:t>30/03/2023</a:t>
             </a:fld>
             <a:endParaRPr lang="pt-BR"/>
           </a:p>
@@ -485,7 +485,7 @@
   <p:clrMapOvr>
     <a:masterClrMapping/>
   </p:clrMapOvr>
-  <p:transition spd="slow" advClick="0" advTm="5000"/>
+  <p:transition spd="slow" advClick="0" advTm="30000"/>
 </p:sldLayout>
 </file>
 
@@ -608,7 +608,7 @@
           <a:p>
             <a:fld id="{410044D7-9578-4EFF-9B44-B51A5B51F4F7}" type="datetimeFigureOut">
               <a:rPr lang="pt-BR" smtClean="0"/>
-              <a:t>29/03/2023</a:t>
+              <a:t>30/03/2023</a:t>
             </a:fld>
             <a:endParaRPr lang="pt-BR"/>
           </a:p>
@@ -666,7 +666,7 @@
   <p:clrMapOvr>
     <a:masterClrMapping/>
   </p:clrMapOvr>
-  <p:transition spd="slow" advClick="0" advTm="5000"/>
+  <p:transition spd="slow" advClick="0" advTm="30000"/>
 </p:sldLayout>
 </file>
 
@@ -779,7 +779,7 @@
           <a:p>
             <a:fld id="{410044D7-9578-4EFF-9B44-B51A5B51F4F7}" type="datetimeFigureOut">
               <a:rPr lang="pt-BR" smtClean="0"/>
-              <a:t>29/03/2023</a:t>
+              <a:t>30/03/2023</a:t>
             </a:fld>
             <a:endParaRPr lang="pt-BR"/>
           </a:p>
@@ -837,7 +837,7 @@
   <p:clrMapOvr>
     <a:masterClrMapping/>
   </p:clrMapOvr>
-  <p:transition spd="slow" advClick="0" advTm="5000"/>
+  <p:transition spd="slow" advClick="0" advTm="30000"/>
 </p:sldLayout>
 </file>
 
@@ -1024,7 +1024,7 @@
           <a:p>
             <a:fld id="{410044D7-9578-4EFF-9B44-B51A5B51F4F7}" type="datetimeFigureOut">
               <a:rPr lang="pt-BR" smtClean="0"/>
-              <a:t>29/03/2023</a:t>
+              <a:t>30/03/2023</a:t>
             </a:fld>
             <a:endParaRPr lang="pt-BR"/>
           </a:p>
@@ -1082,7 +1082,7 @@
   <p:clrMapOvr>
     <a:masterClrMapping/>
   </p:clrMapOvr>
-  <p:transition spd="slow" advClick="0" advTm="5000"/>
+  <p:transition spd="slow" advClick="0" advTm="30000"/>
 </p:sldLayout>
 </file>
 
@@ -1257,7 +1257,7 @@
           <a:p>
             <a:fld id="{410044D7-9578-4EFF-9B44-B51A5B51F4F7}" type="datetimeFigureOut">
               <a:rPr lang="pt-BR" smtClean="0"/>
-              <a:t>29/03/2023</a:t>
+              <a:t>30/03/2023</a:t>
             </a:fld>
             <a:endParaRPr lang="pt-BR"/>
           </a:p>
@@ -1315,7 +1315,7 @@
   <p:clrMapOvr>
     <a:masterClrMapping/>
   </p:clrMapOvr>
-  <p:transition spd="slow" advClick="0" advTm="5000"/>
+  <p:transition spd="slow" advClick="0" advTm="30000"/>
 </p:sldLayout>
 </file>
 
@@ -1625,7 +1625,7 @@
           <a:p>
             <a:fld id="{410044D7-9578-4EFF-9B44-B51A5B51F4F7}" type="datetimeFigureOut">
               <a:rPr lang="pt-BR" smtClean="0"/>
-              <a:t>29/03/2023</a:t>
+              <a:t>30/03/2023</a:t>
             </a:fld>
             <a:endParaRPr lang="pt-BR"/>
           </a:p>
@@ -1683,7 +1683,7 @@
   <p:clrMapOvr>
     <a:masterClrMapping/>
   </p:clrMapOvr>
-  <p:transition spd="slow" advClick="0" advTm="5000"/>
+  <p:transition spd="slow" advClick="0" advTm="30000"/>
 </p:sldLayout>
 </file>
 
@@ -1744,7 +1744,7 @@
           <a:p>
             <a:fld id="{410044D7-9578-4EFF-9B44-B51A5B51F4F7}" type="datetimeFigureOut">
               <a:rPr lang="pt-BR" smtClean="0"/>
-              <a:t>29/03/2023</a:t>
+              <a:t>30/03/2023</a:t>
             </a:fld>
             <a:endParaRPr lang="pt-BR"/>
           </a:p>
@@ -1802,7 +1802,7 @@
   <p:clrMapOvr>
     <a:masterClrMapping/>
   </p:clrMapOvr>
-  <p:transition spd="slow" advClick="0" advTm="5000"/>
+  <p:transition spd="slow" advClick="0" advTm="30000"/>
 </p:sldLayout>
 </file>
 
@@ -1840,7 +1840,7 @@
           <a:p>
             <a:fld id="{410044D7-9578-4EFF-9B44-B51A5B51F4F7}" type="datetimeFigureOut">
               <a:rPr lang="pt-BR" smtClean="0"/>
-              <a:t>29/03/2023</a:t>
+              <a:t>30/03/2023</a:t>
             </a:fld>
             <a:endParaRPr lang="pt-BR"/>
           </a:p>
@@ -1898,7 +1898,7 @@
   <p:clrMapOvr>
     <a:masterClrMapping/>
   </p:clrMapOvr>
-  <p:transition spd="slow" advClick="0" advTm="5000"/>
+  <p:transition spd="slow" advClick="0" advTm="30000"/>
 </p:sldLayout>
 </file>
 
@@ -2118,7 +2118,7 @@
           <a:p>
             <a:fld id="{410044D7-9578-4EFF-9B44-B51A5B51F4F7}" type="datetimeFigureOut">
               <a:rPr lang="pt-BR" smtClean="0"/>
-              <a:t>29/03/2023</a:t>
+              <a:t>30/03/2023</a:t>
             </a:fld>
             <a:endParaRPr lang="pt-BR"/>
           </a:p>
@@ -2176,7 +2176,7 @@
   <p:clrMapOvr>
     <a:masterClrMapping/>
   </p:clrMapOvr>
-  <p:transition spd="slow" advClick="0" advTm="5000"/>
+  <p:transition spd="slow" advClick="0" advTm="30000"/>
 </p:sldLayout>
 </file>
 
@@ -2376,7 +2376,7 @@
           <a:p>
             <a:fld id="{410044D7-9578-4EFF-9B44-B51A5B51F4F7}" type="datetimeFigureOut">
               <a:rPr lang="pt-BR" smtClean="0"/>
-              <a:t>29/03/2023</a:t>
+              <a:t>30/03/2023</a:t>
             </a:fld>
             <a:endParaRPr lang="pt-BR"/>
           </a:p>
@@ -2434,7 +2434,7 @@
   <p:clrMapOvr>
     <a:masterClrMapping/>
   </p:clrMapOvr>
-  <p:transition spd="slow" advClick="0" advTm="5000"/>
+  <p:transition spd="slow" advClick="0" advTm="30000"/>
 </p:sldLayout>
 </file>
 
@@ -2590,7 +2590,7 @@
           <a:p>
             <a:fld id="{410044D7-9578-4EFF-9B44-B51A5B51F4F7}" type="datetimeFigureOut">
               <a:rPr lang="pt-BR" smtClean="0"/>
-              <a:t>29/03/2023</a:t>
+              <a:t>30/03/2023</a:t>
             </a:fld>
             <a:endParaRPr lang="pt-BR"/>
           </a:p>
@@ -2695,7 +2695,7 @@
     <p:sldLayoutId id="2147483670" r:id="rId10"/>
     <p:sldLayoutId id="2147483671" r:id="rId11"/>
   </p:sldLayoutIdLst>
-  <p:transition spd="slow" advClick="0" advTm="5000"/>
+  <p:transition spd="slow" advClick="0" advTm="30000"/>
   <p:txStyles>
     <p:titleStyle>
       <a:lvl1pPr algn="l" defTabSz="914400" rtl="0" eaLnBrk="1" latinLnBrk="0" hangingPunct="1">
@@ -3092,7 +3092,7 @@
   <p:clrMapOvr>
     <a:masterClrMapping/>
   </p:clrMapOvr>
-  <p:transition spd="slow" advClick="0" advTm="5000"/>
+  <p:transition spd="slow" advClick="0" advTm="30000"/>
 </p:sld>
 </file>
 
@@ -3209,7 +3209,7 @@
   <p:clrMapOvr>
     <a:masterClrMapping/>
   </p:clrMapOvr>
-  <p:transition spd="slow" advClick="0" advTm="5000"/>
+  <p:transition spd="slow" advClick="0" advTm="30000"/>
 </p:sld>
 </file>
 
@@ -3326,7 +3326,7 @@
   <p:clrMapOvr>
     <a:masterClrMapping/>
   </p:clrMapOvr>
-  <p:transition spd="slow" advClick="0" advTm="5000"/>
+  <p:transition spd="slow" advClick="0" advTm="30000"/>
 </p:sld>
 </file>
 

</xml_diff>